<commit_message>
Unknown changes- see prior version
</commit_message>
<xml_diff>
--- a/2019/ECP/06.HPO/hpo.pptx
+++ b/2019/ECP/06.HPO/hpo.pptx
@@ -32035,15 +32035,7 @@
             </a:br>
             <a:r>
               <a:rPr lang="en-US" dirty="0" smtClean="0"/>
-              <a:t>Tom Brettin, Jon Ozik, Nick Collier, Rajeev Jain (ANL</a:t>
-            </a:r>
-            <a:r>
-              <a:rPr lang="en-US" dirty="0" smtClean="0"/>
-              <a:t>), Harry Yoo (ANL)</a:t>
-            </a:r>
-            <a:r>
-              <a:rPr lang="en-US" dirty="0" smtClean="0"/>
-              <a:t/>
+              <a:t>Tom Brettin, Jon Ozik, Nick Collier, Rajeev Jain (ANL), Harry Yoo (ANL)</a:t>
             </a:r>
             <a:br>
               <a:rPr lang="en-US" dirty="0" smtClean="0"/>
@@ -32054,11 +32046,7 @@
             </a:r>
             <a:r>
               <a:rPr lang="en-US" smtClean="0"/>
-              <a:t>LANL</a:t>
-            </a:r>
-            <a:r>
-              <a:rPr lang="en-US" smtClean="0"/>
-              <a:t>),</a:t>
+              <a:t>LANL),</a:t>
             </a:r>
             <a:r>
               <a:rPr lang="en-US" dirty="0" smtClean="0"/>
@@ -38765,7 +38753,6 @@
               <a:rPr lang="en-US" dirty="0" smtClean="0"/>
               <a:t>Demo of Swift/T and CANDLE/Supervisor</a:t>
             </a:r>
-            <a:endParaRPr lang="en-US" dirty="0" smtClean="0"/>
           </a:p>
         </p:txBody>
       </p:sp>

</xml_diff>